<commit_message>
Modified the starting slide
</commit_message>
<xml_diff>
--- a/Silde/Group 4.pptx
+++ b/Silde/Group 4.pptx
@@ -3122,8 +3122,8 @@
         </p:nvSpPr>
         <p:spPr>
           <a:xfrm>
-            <a:off x="857250" y="381000"/>
-            <a:ext cx="7143750" cy="1569660"/>
+            <a:off x="857250" y="893133"/>
+            <a:ext cx="7143750" cy="1323439"/>
           </a:xfrm>
           <a:prstGeom prst="rect">
             <a:avLst/>
@@ -3138,13 +3138,13 @@
           <a:p>
             <a:pPr algn="ctr"/>
             <a:r>
-              <a:rPr lang="en-US" sz="4800" b="1" dirty="0" smtClean="0">
+              <a:rPr lang="en-US" sz="8000" b="1" dirty="0" smtClean="0">
                 <a:latin typeface="Times New Roman"/>
                 <a:cs typeface="Times New Roman"/>
               </a:rPr>
-              <a:t>Personal Tour Guide with Augmented Reality</a:t>
-            </a:r>
-            <a:endParaRPr lang="en-US" sz="4800" b="1" dirty="0">
+              <a:t>INNCITY</a:t>
+            </a:r>
+            <a:endParaRPr lang="en-US" sz="8000" b="1" dirty="0">
               <a:latin typeface="Times New Roman"/>
               <a:cs typeface="Times New Roman"/>
             </a:endParaRPr>
@@ -3159,8 +3159,8 @@
         </p:nvSpPr>
         <p:spPr>
           <a:xfrm>
-            <a:off x="4778375" y="4762500"/>
-            <a:ext cx="4191001" cy="1938992"/>
+            <a:off x="5100627" y="4364382"/>
+            <a:ext cx="4191001" cy="2308324"/>
           </a:xfrm>
           <a:prstGeom prst="rect">
             <a:avLst/>
@@ -3174,6 +3174,12 @@
           <a:lstStyle/>
           <a:p>
             <a:r>
+              <a:rPr lang="en-US" sz="2400" b="1" u="sng" dirty="0" smtClean="0"/>
+              <a:t>GROUP MEMBERS:</a:t>
+            </a:r>
+          </a:p>
+          <a:p>
+            <a:r>
               <a:rPr lang="en-US" sz="2400" dirty="0" smtClean="0"/>
               <a:t>ALEN THOMAS (5)</a:t>
             </a:r>
@@ -3245,8 +3251,8 @@
         </p:nvSpPr>
         <p:spPr>
           <a:xfrm>
-            <a:off x="2095500" y="2047875"/>
-            <a:ext cx="4873625" cy="584776"/>
+            <a:off x="4071129" y="3754083"/>
+            <a:ext cx="4873625" cy="646331"/>
           </a:xfrm>
           <a:prstGeom prst="rect">
             <a:avLst/>
@@ -3261,10 +3267,10 @@
           <a:p>
             <a:pPr algn="ctr"/>
             <a:r>
-              <a:rPr lang="en-US" sz="3200" b="1" dirty="0" smtClean="0"/>
+              <a:rPr lang="en-US" sz="3600" b="1" dirty="0" smtClean="0"/>
               <a:t>GROUP NO: 04</a:t>
             </a:r>
-            <a:endParaRPr lang="en-US" sz="3200" b="1" dirty="0"/>
+            <a:endParaRPr lang="en-US" sz="3600" b="1" dirty="0"/>
           </a:p>
         </p:txBody>
       </p:sp>
@@ -3276,8 +3282,8 @@
         </p:nvSpPr>
         <p:spPr>
           <a:xfrm>
-            <a:off x="1508126" y="2914650"/>
-            <a:ext cx="5835650" cy="954107"/>
+            <a:off x="366298" y="4876245"/>
+            <a:ext cx="3553183" cy="1200328"/>
           </a:xfrm>
           <a:prstGeom prst="rect">
             <a:avLst/>
@@ -3292,25 +3298,55 @@
           <a:p>
             <a:pPr algn="ctr"/>
             <a:r>
-              <a:rPr lang="en-US" sz="2800" b="1" dirty="0" smtClean="0"/>
-              <a:t>PROJECT GUIDE: MS. GREESHMA K</a:t>
+              <a:rPr lang="en-US" sz="2400" b="1" dirty="0" smtClean="0"/>
+              <a:t>PROJECT GUIDE: </a:t>
             </a:r>
           </a:p>
           <a:p>
             <a:pPr algn="ctr"/>
             <a:r>
-              <a:rPr lang="en-US" sz="2800" b="1" dirty="0" smtClean="0"/>
-              <a:t>(Asst. Professor CSE </a:t>
-            </a:r>
-            <a:r>
-              <a:rPr lang="en-US" sz="2800" b="1" dirty="0" err="1" smtClean="0"/>
-              <a:t>Dept</a:t>
-            </a:r>
-            <a:r>
-              <a:rPr lang="en-US" sz="2800" b="1" dirty="0" smtClean="0"/>
-              <a:t>)</a:t>
-            </a:r>
-            <a:endParaRPr lang="en-US" sz="2800" b="1" dirty="0"/>
+              <a:rPr lang="en-US" sz="2400" dirty="0" smtClean="0"/>
+              <a:t>MS. GREESHMA K</a:t>
+            </a:r>
+          </a:p>
+          <a:p>
+            <a:pPr algn="ctr"/>
+            <a:r>
+              <a:rPr lang="en-US" sz="2400" dirty="0" smtClean="0"/>
+              <a:t>(Asst. Professor CSE Dept.)</a:t>
+            </a:r>
+            <a:endParaRPr lang="en-US" sz="2400" dirty="0"/>
+          </a:p>
+        </p:txBody>
+      </p:sp>
+      <p:sp>
+        <p:nvSpPr>
+          <p:cNvPr id="9" name="TextBox 8"/>
+          <p:cNvSpPr txBox="1"/>
+          <p:nvPr/>
+        </p:nvSpPr>
+        <p:spPr>
+          <a:xfrm>
+            <a:off x="2100433" y="2315439"/>
+            <a:ext cx="4873625" cy="646331"/>
+          </a:xfrm>
+          <a:prstGeom prst="rect">
+            <a:avLst/>
+          </a:prstGeom>
+          <a:noFill/>
+        </p:spPr>
+        <p:txBody>
+          <a:bodyPr wrap="square" rtlCol="0">
+            <a:spAutoFit/>
+          </a:bodyPr>
+          <a:lstStyle/>
+          <a:p>
+            <a:pPr algn="ctr"/>
+            <a:r>
+              <a:rPr lang="en-US" sz="3600" i="1" dirty="0" smtClean="0"/>
+              <a:t>Presented By,</a:t>
+            </a:r>
+            <a:endParaRPr lang="en-US" sz="3600" i="1" dirty="0"/>
           </a:p>
         </p:txBody>
       </p:sp>
@@ -5095,11 +5131,7 @@
           <a:p>
             <a:r>
               <a:rPr lang="en-US" dirty="0" smtClean="0"/>
-              <a:t>OUT</a:t>
-            </a:r>
-            <a:r>
-              <a:rPr lang="en-US" dirty="0" smtClean="0"/>
-              <a:t>PUT DESCRIPTION</a:t>
+              <a:t>OUTPUT DESCRIPTION</a:t>
             </a:r>
             <a:endParaRPr lang="en-US" dirty="0"/>
           </a:p>
@@ -5523,10 +5555,10 @@
           <a:lstStyle/>
           <a:p>
             <a:r>
-              <a:rPr lang="en-US" dirty="0" smtClean="0"/>
+              <a:rPr lang="en-US" sz="6600" dirty="0" smtClean="0"/>
               <a:t>THANK YOU</a:t>
             </a:r>
-            <a:endParaRPr lang="en-US" dirty="0"/>
+            <a:endParaRPr lang="en-US" sz="6600" dirty="0"/>
           </a:p>
         </p:txBody>
       </p:sp>

</xml_diff>

<commit_message>
update slide with bullet & update roughReport
</commit_message>
<xml_diff>
--- a/Silde/Group 4.pptx
+++ b/Silde/Group 4.pptx
@@ -307,7 +307,8 @@
           <a:p>
             <a:fld id="{599F5FF4-9C1B-F64C-8935-59EC43A08F66}" type="datetimeFigureOut">
               <a:rPr lang="en-US" smtClean="0"/>
-              <a:t>13/09/14</a:t>
+              <a:pPr/>
+              <a:t>9/16/2014</a:t>
             </a:fld>
             <a:endParaRPr lang="en-US"/>
           </a:p>
@@ -349,6 +350,7 @@
           <a:p>
             <a:fld id="{898C2278-162D-484A-A64B-C891DAB5F0B5}" type="slidenum">
               <a:rPr lang="en-US" smtClean="0"/>
+              <a:pPr/>
               <a:t>‹#›</a:t>
             </a:fld>
             <a:endParaRPr lang="en-US"/>
@@ -358,7 +360,7 @@
     </p:spTree>
     <p:extLst>
       <p:ext uri="{BB962C8B-B14F-4D97-AF65-F5344CB8AC3E}">
-        <p14:creationId xmlns:p14="http://schemas.microsoft.com/office/powerpoint/2010/main" val="3403680424"/>
+        <p14:creationId xmlns:p14="http://schemas.microsoft.com/office/powerpoint/2010/main" xmlns="" val="3403680424"/>
       </p:ext>
     </p:extLst>
   </p:cSld>
@@ -477,7 +479,8 @@
           <a:p>
             <a:fld id="{599F5FF4-9C1B-F64C-8935-59EC43A08F66}" type="datetimeFigureOut">
               <a:rPr lang="en-US" smtClean="0"/>
-              <a:t>13/09/14</a:t>
+              <a:pPr/>
+              <a:t>9/16/2014</a:t>
             </a:fld>
             <a:endParaRPr lang="en-US"/>
           </a:p>
@@ -519,6 +522,7 @@
           <a:p>
             <a:fld id="{898C2278-162D-484A-A64B-C891DAB5F0B5}" type="slidenum">
               <a:rPr lang="en-US" smtClean="0"/>
+              <a:pPr/>
               <a:t>‹#›</a:t>
             </a:fld>
             <a:endParaRPr lang="en-US"/>
@@ -528,7 +532,7 @@
     </p:spTree>
     <p:extLst>
       <p:ext uri="{BB962C8B-B14F-4D97-AF65-F5344CB8AC3E}">
-        <p14:creationId xmlns:p14="http://schemas.microsoft.com/office/powerpoint/2010/main" val="2058831606"/>
+        <p14:creationId xmlns:p14="http://schemas.microsoft.com/office/powerpoint/2010/main" xmlns="" val="2058831606"/>
       </p:ext>
     </p:extLst>
   </p:cSld>
@@ -657,7 +661,8 @@
           <a:p>
             <a:fld id="{599F5FF4-9C1B-F64C-8935-59EC43A08F66}" type="datetimeFigureOut">
               <a:rPr lang="en-US" smtClean="0"/>
-              <a:t>13/09/14</a:t>
+              <a:pPr/>
+              <a:t>9/16/2014</a:t>
             </a:fld>
             <a:endParaRPr lang="en-US"/>
           </a:p>
@@ -699,6 +704,7 @@
           <a:p>
             <a:fld id="{898C2278-162D-484A-A64B-C891DAB5F0B5}" type="slidenum">
               <a:rPr lang="en-US" smtClean="0"/>
+              <a:pPr/>
               <a:t>‹#›</a:t>
             </a:fld>
             <a:endParaRPr lang="en-US"/>
@@ -708,7 +714,7 @@
     </p:spTree>
     <p:extLst>
       <p:ext uri="{BB962C8B-B14F-4D97-AF65-F5344CB8AC3E}">
-        <p14:creationId xmlns:p14="http://schemas.microsoft.com/office/powerpoint/2010/main" val="1221531764"/>
+        <p14:creationId xmlns:p14="http://schemas.microsoft.com/office/powerpoint/2010/main" xmlns="" val="1221531764"/>
       </p:ext>
     </p:extLst>
   </p:cSld>
@@ -827,7 +833,8 @@
           <a:p>
             <a:fld id="{599F5FF4-9C1B-F64C-8935-59EC43A08F66}" type="datetimeFigureOut">
               <a:rPr lang="en-US" smtClean="0"/>
-              <a:t>13/09/14</a:t>
+              <a:pPr/>
+              <a:t>9/16/2014</a:t>
             </a:fld>
             <a:endParaRPr lang="en-US"/>
           </a:p>
@@ -869,6 +876,7 @@
           <a:p>
             <a:fld id="{898C2278-162D-484A-A64B-C891DAB5F0B5}" type="slidenum">
               <a:rPr lang="en-US" smtClean="0"/>
+              <a:pPr/>
               <a:t>‹#›</a:t>
             </a:fld>
             <a:endParaRPr lang="en-US"/>
@@ -878,7 +886,7 @@
     </p:spTree>
     <p:extLst>
       <p:ext uri="{BB962C8B-B14F-4D97-AF65-F5344CB8AC3E}">
-        <p14:creationId xmlns:p14="http://schemas.microsoft.com/office/powerpoint/2010/main" val="2684106810"/>
+        <p14:creationId xmlns:p14="http://schemas.microsoft.com/office/powerpoint/2010/main" xmlns="" val="2684106810"/>
       </p:ext>
     </p:extLst>
   </p:cSld>
@@ -1073,7 +1081,8 @@
           <a:p>
             <a:fld id="{599F5FF4-9C1B-F64C-8935-59EC43A08F66}" type="datetimeFigureOut">
               <a:rPr lang="en-US" smtClean="0"/>
-              <a:t>13/09/14</a:t>
+              <a:pPr/>
+              <a:t>9/16/2014</a:t>
             </a:fld>
             <a:endParaRPr lang="en-US"/>
           </a:p>
@@ -1115,6 +1124,7 @@
           <a:p>
             <a:fld id="{898C2278-162D-484A-A64B-C891DAB5F0B5}" type="slidenum">
               <a:rPr lang="en-US" smtClean="0"/>
+              <a:pPr/>
               <a:t>‹#›</a:t>
             </a:fld>
             <a:endParaRPr lang="en-US"/>
@@ -1124,7 +1134,7 @@
     </p:spTree>
     <p:extLst>
       <p:ext uri="{BB962C8B-B14F-4D97-AF65-F5344CB8AC3E}">
-        <p14:creationId xmlns:p14="http://schemas.microsoft.com/office/powerpoint/2010/main" val="2775015981"/>
+        <p14:creationId xmlns:p14="http://schemas.microsoft.com/office/powerpoint/2010/main" xmlns="" val="2775015981"/>
       </p:ext>
     </p:extLst>
   </p:cSld>
@@ -1361,7 +1371,8 @@
           <a:p>
             <a:fld id="{599F5FF4-9C1B-F64C-8935-59EC43A08F66}" type="datetimeFigureOut">
               <a:rPr lang="en-US" smtClean="0"/>
-              <a:t>13/09/14</a:t>
+              <a:pPr/>
+              <a:t>9/16/2014</a:t>
             </a:fld>
             <a:endParaRPr lang="en-US"/>
           </a:p>
@@ -1403,6 +1414,7 @@
           <a:p>
             <a:fld id="{898C2278-162D-484A-A64B-C891DAB5F0B5}" type="slidenum">
               <a:rPr lang="en-US" smtClean="0"/>
+              <a:pPr/>
               <a:t>‹#›</a:t>
             </a:fld>
             <a:endParaRPr lang="en-US"/>
@@ -1412,7 +1424,7 @@
     </p:spTree>
     <p:extLst>
       <p:ext uri="{BB962C8B-B14F-4D97-AF65-F5344CB8AC3E}">
-        <p14:creationId xmlns:p14="http://schemas.microsoft.com/office/powerpoint/2010/main" val="3709802561"/>
+        <p14:creationId xmlns:p14="http://schemas.microsoft.com/office/powerpoint/2010/main" xmlns="" val="3709802561"/>
       </p:ext>
     </p:extLst>
   </p:cSld>
@@ -1783,7 +1795,8 @@
           <a:p>
             <a:fld id="{599F5FF4-9C1B-F64C-8935-59EC43A08F66}" type="datetimeFigureOut">
               <a:rPr lang="en-US" smtClean="0"/>
-              <a:t>13/09/14</a:t>
+              <a:pPr/>
+              <a:t>9/16/2014</a:t>
             </a:fld>
             <a:endParaRPr lang="en-US"/>
           </a:p>
@@ -1825,6 +1838,7 @@
           <a:p>
             <a:fld id="{898C2278-162D-484A-A64B-C891DAB5F0B5}" type="slidenum">
               <a:rPr lang="en-US" smtClean="0"/>
+              <a:pPr/>
               <a:t>‹#›</a:t>
             </a:fld>
             <a:endParaRPr lang="en-US"/>
@@ -1834,7 +1848,7 @@
     </p:spTree>
     <p:extLst>
       <p:ext uri="{BB962C8B-B14F-4D97-AF65-F5344CB8AC3E}">
-        <p14:creationId xmlns:p14="http://schemas.microsoft.com/office/powerpoint/2010/main" val="670579526"/>
+        <p14:creationId xmlns:p14="http://schemas.microsoft.com/office/powerpoint/2010/main" xmlns="" val="670579526"/>
       </p:ext>
     </p:extLst>
   </p:cSld>
@@ -1901,7 +1915,8 @@
           <a:p>
             <a:fld id="{599F5FF4-9C1B-F64C-8935-59EC43A08F66}" type="datetimeFigureOut">
               <a:rPr lang="en-US" smtClean="0"/>
-              <a:t>13/09/14</a:t>
+              <a:pPr/>
+              <a:t>9/16/2014</a:t>
             </a:fld>
             <a:endParaRPr lang="en-US"/>
           </a:p>
@@ -1943,6 +1958,7 @@
           <a:p>
             <a:fld id="{898C2278-162D-484A-A64B-C891DAB5F0B5}" type="slidenum">
               <a:rPr lang="en-US" smtClean="0"/>
+              <a:pPr/>
               <a:t>‹#›</a:t>
             </a:fld>
             <a:endParaRPr lang="en-US"/>
@@ -1952,7 +1968,7 @@
     </p:spTree>
     <p:extLst>
       <p:ext uri="{BB962C8B-B14F-4D97-AF65-F5344CB8AC3E}">
-        <p14:creationId xmlns:p14="http://schemas.microsoft.com/office/powerpoint/2010/main" val="866197097"/>
+        <p14:creationId xmlns:p14="http://schemas.microsoft.com/office/powerpoint/2010/main" xmlns="" val="866197097"/>
       </p:ext>
     </p:extLst>
   </p:cSld>
@@ -1996,7 +2012,8 @@
           <a:p>
             <a:fld id="{599F5FF4-9C1B-F64C-8935-59EC43A08F66}" type="datetimeFigureOut">
               <a:rPr lang="en-US" smtClean="0"/>
-              <a:t>13/09/14</a:t>
+              <a:pPr/>
+              <a:t>9/16/2014</a:t>
             </a:fld>
             <a:endParaRPr lang="en-US"/>
           </a:p>
@@ -2038,6 +2055,7 @@
           <a:p>
             <a:fld id="{898C2278-162D-484A-A64B-C891DAB5F0B5}" type="slidenum">
               <a:rPr lang="en-US" smtClean="0"/>
+              <a:pPr/>
               <a:t>‹#›</a:t>
             </a:fld>
             <a:endParaRPr lang="en-US"/>
@@ -2047,7 +2065,7 @@
     </p:spTree>
     <p:extLst>
       <p:ext uri="{BB962C8B-B14F-4D97-AF65-F5344CB8AC3E}">
-        <p14:creationId xmlns:p14="http://schemas.microsoft.com/office/powerpoint/2010/main" val="2990039914"/>
+        <p14:creationId xmlns:p14="http://schemas.microsoft.com/office/powerpoint/2010/main" xmlns="" val="2990039914"/>
       </p:ext>
     </p:extLst>
   </p:cSld>
@@ -2273,7 +2291,8 @@
           <a:p>
             <a:fld id="{599F5FF4-9C1B-F64C-8935-59EC43A08F66}" type="datetimeFigureOut">
               <a:rPr lang="en-US" smtClean="0"/>
-              <a:t>13/09/14</a:t>
+              <a:pPr/>
+              <a:t>9/16/2014</a:t>
             </a:fld>
             <a:endParaRPr lang="en-US"/>
           </a:p>
@@ -2315,6 +2334,7 @@
           <a:p>
             <a:fld id="{898C2278-162D-484A-A64B-C891DAB5F0B5}" type="slidenum">
               <a:rPr lang="en-US" smtClean="0"/>
+              <a:pPr/>
               <a:t>‹#›</a:t>
             </a:fld>
             <a:endParaRPr lang="en-US"/>
@@ -2324,7 +2344,7 @@
     </p:spTree>
     <p:extLst>
       <p:ext uri="{BB962C8B-B14F-4D97-AF65-F5344CB8AC3E}">
-        <p14:creationId xmlns:p14="http://schemas.microsoft.com/office/powerpoint/2010/main" val="2699871089"/>
+        <p14:creationId xmlns:p14="http://schemas.microsoft.com/office/powerpoint/2010/main" xmlns="" val="2699871089"/>
       </p:ext>
     </p:extLst>
   </p:cSld>
@@ -2526,7 +2546,8 @@
           <a:p>
             <a:fld id="{599F5FF4-9C1B-F64C-8935-59EC43A08F66}" type="datetimeFigureOut">
               <a:rPr lang="en-US" smtClean="0"/>
-              <a:t>13/09/14</a:t>
+              <a:pPr/>
+              <a:t>9/16/2014</a:t>
             </a:fld>
             <a:endParaRPr lang="en-US"/>
           </a:p>
@@ -2568,6 +2589,7 @@
           <a:p>
             <a:fld id="{898C2278-162D-484A-A64B-C891DAB5F0B5}" type="slidenum">
               <a:rPr lang="en-US" smtClean="0"/>
+              <a:pPr/>
               <a:t>‹#›</a:t>
             </a:fld>
             <a:endParaRPr lang="en-US"/>
@@ -2577,7 +2599,7 @@
     </p:spTree>
     <p:extLst>
       <p:ext uri="{BB962C8B-B14F-4D97-AF65-F5344CB8AC3E}">
-        <p14:creationId xmlns:p14="http://schemas.microsoft.com/office/powerpoint/2010/main" val="914946878"/>
+        <p14:creationId xmlns:p14="http://schemas.microsoft.com/office/powerpoint/2010/main" xmlns="" val="914946878"/>
       </p:ext>
     </p:extLst>
   </p:cSld>
@@ -2739,7 +2761,8 @@
           <a:p>
             <a:fld id="{599F5FF4-9C1B-F64C-8935-59EC43A08F66}" type="datetimeFigureOut">
               <a:rPr lang="en-US" smtClean="0"/>
-              <a:t>13/09/14</a:t>
+              <a:pPr/>
+              <a:t>9/16/2014</a:t>
             </a:fld>
             <a:endParaRPr lang="en-US"/>
           </a:p>
@@ -2817,6 +2840,7 @@
           <a:p>
             <a:fld id="{898C2278-162D-484A-A64B-C891DAB5F0B5}" type="slidenum">
               <a:rPr lang="en-US" smtClean="0"/>
+              <a:pPr/>
               <a:t>‹#›</a:t>
             </a:fld>
             <a:endParaRPr lang="en-US"/>
@@ -2826,7 +2850,7 @@
     </p:spTree>
     <p:extLst>
       <p:ext uri="{BB962C8B-B14F-4D97-AF65-F5344CB8AC3E}">
-        <p14:creationId xmlns:p14="http://schemas.microsoft.com/office/powerpoint/2010/main" val="742579349"/>
+        <p14:creationId xmlns:p14="http://schemas.microsoft.com/office/powerpoint/2010/main" xmlns="" val="742579349"/>
       </p:ext>
     </p:extLst>
   </p:cSld>
@@ -3353,7 +3377,7 @@
     </p:spTree>
     <p:extLst>
       <p:ext uri="{BB962C8B-B14F-4D97-AF65-F5344CB8AC3E}">
-        <p14:creationId xmlns:p14="http://schemas.microsoft.com/office/powerpoint/2010/main" val="2967694906"/>
+        <p14:creationId xmlns:p14="http://schemas.microsoft.com/office/powerpoint/2010/main" xmlns="" val="2967694906"/>
       </p:ext>
     </p:extLst>
   </p:cSld>
@@ -3363,7 +3387,7 @@
   <p:timing>
     <p:tnLst>
       <p:par>
-        <p:cTn xmlns:p14="http://schemas.microsoft.com/office/powerpoint/2010/main" id="1" dur="indefinite" restart="never" nodeType="tmRoot"/>
+        <p:cTn id="1" dur="indefinite" restart="never" nodeType="tmRoot"/>
       </p:par>
     </p:tnLst>
   </p:timing>
@@ -3415,7 +3439,7 @@
     </p:spTree>
     <p:extLst>
       <p:ext uri="{BB962C8B-B14F-4D97-AF65-F5344CB8AC3E}">
-        <p14:creationId xmlns:p14="http://schemas.microsoft.com/office/powerpoint/2010/main" val="3811426703"/>
+        <p14:creationId xmlns:p14="http://schemas.microsoft.com/office/powerpoint/2010/main" xmlns="" val="3811426703"/>
       </p:ext>
     </p:extLst>
   </p:cSld>
@@ -3425,7 +3449,7 @@
   <p:timing>
     <p:tnLst>
       <p:par>
-        <p:cTn xmlns:p14="http://schemas.microsoft.com/office/powerpoint/2010/main" id="1" dur="indefinite" restart="never" nodeType="tmRoot"/>
+        <p:cTn id="1" dur="indefinite" restart="never" nodeType="tmRoot"/>
       </p:par>
     </p:tnLst>
   </p:timing>
@@ -3477,7 +3501,7 @@
     </p:spTree>
     <p:extLst>
       <p:ext uri="{BB962C8B-B14F-4D97-AF65-F5344CB8AC3E}">
-        <p14:creationId xmlns:p14="http://schemas.microsoft.com/office/powerpoint/2010/main" val="2526601490"/>
+        <p14:creationId xmlns:p14="http://schemas.microsoft.com/office/powerpoint/2010/main" xmlns="" val="2526601490"/>
       </p:ext>
     </p:extLst>
   </p:cSld>
@@ -3487,7 +3511,7 @@
   <p:timing>
     <p:tnLst>
       <p:par>
-        <p:cTn xmlns:p14="http://schemas.microsoft.com/office/powerpoint/2010/main" id="1" dur="indefinite" restart="never" nodeType="tmRoot"/>
+        <p:cTn id="1" dur="indefinite" restart="never" nodeType="tmRoot"/>
       </p:par>
     </p:tnLst>
   </p:timing>
@@ -4768,7 +4792,7 @@
     </p:spTree>
     <p:extLst>
       <p:ext uri="{BB962C8B-B14F-4D97-AF65-F5344CB8AC3E}">
-        <p14:creationId xmlns:p14="http://schemas.microsoft.com/office/powerpoint/2010/main" val="1686361186"/>
+        <p14:creationId xmlns:p14="http://schemas.microsoft.com/office/powerpoint/2010/main" xmlns="" val="1686361186"/>
       </p:ext>
     </p:extLst>
   </p:cSld>
@@ -4778,7 +4802,7 @@
   <p:timing>
     <p:tnLst>
       <p:par>
-        <p:cTn xmlns:p14="http://schemas.microsoft.com/office/powerpoint/2010/main" id="1" dur="indefinite" restart="never" nodeType="tmRoot"/>
+        <p:cTn id="1" dur="indefinite" restart="never" nodeType="tmRoot"/>
       </p:par>
     </p:tnLst>
   </p:timing>
@@ -4830,7 +4854,7 @@
     </p:spTree>
     <p:extLst>
       <p:ext uri="{BB962C8B-B14F-4D97-AF65-F5344CB8AC3E}">
-        <p14:creationId xmlns:p14="http://schemas.microsoft.com/office/powerpoint/2010/main" val="443961324"/>
+        <p14:creationId xmlns:p14="http://schemas.microsoft.com/office/powerpoint/2010/main" xmlns="" val="443961324"/>
       </p:ext>
     </p:extLst>
   </p:cSld>
@@ -4840,7 +4864,7 @@
   <p:timing>
     <p:tnLst>
       <p:par>
-        <p:cTn xmlns:p14="http://schemas.microsoft.com/office/powerpoint/2010/main" id="1" dur="indefinite" restart="never" nodeType="tmRoot"/>
+        <p:cTn id="1" dur="indefinite" restart="never" nodeType="tmRoot"/>
       </p:par>
     </p:tnLst>
   </p:timing>
@@ -4892,7 +4916,7 @@
     </p:spTree>
     <p:extLst>
       <p:ext uri="{BB962C8B-B14F-4D97-AF65-F5344CB8AC3E}">
-        <p14:creationId xmlns:p14="http://schemas.microsoft.com/office/powerpoint/2010/main" val="1365352401"/>
+        <p14:creationId xmlns:p14="http://schemas.microsoft.com/office/powerpoint/2010/main" xmlns="" val="1365352401"/>
       </p:ext>
     </p:extLst>
   </p:cSld>
@@ -4902,7 +4926,7 @@
   <p:timing>
     <p:tnLst>
       <p:par>
-        <p:cTn xmlns:p14="http://schemas.microsoft.com/office/powerpoint/2010/main" id="1" dur="indefinite" restart="never" nodeType="tmRoot"/>
+        <p:cTn id="1" dur="indefinite" restart="never" nodeType="tmRoot"/>
       </p:par>
     </p:tnLst>
   </p:timing>
@@ -4954,7 +4978,7 @@
     </p:spTree>
     <p:extLst>
       <p:ext uri="{BB962C8B-B14F-4D97-AF65-F5344CB8AC3E}">
-        <p14:creationId xmlns:p14="http://schemas.microsoft.com/office/powerpoint/2010/main" val="1672586050"/>
+        <p14:creationId xmlns:p14="http://schemas.microsoft.com/office/powerpoint/2010/main" xmlns="" val="1672586050"/>
       </p:ext>
     </p:extLst>
   </p:cSld>
@@ -4964,7 +4988,7 @@
   <p:timing>
     <p:tnLst>
       <p:par>
-        <p:cTn xmlns:p14="http://schemas.microsoft.com/office/powerpoint/2010/main" id="1" dur="indefinite" restart="never" nodeType="tmRoot"/>
+        <p:cTn id="1" dur="indefinite" restart="never" nodeType="tmRoot"/>
       </p:par>
     </p:tnLst>
   </p:timing>
@@ -5016,7 +5040,7 @@
     </p:spTree>
     <p:extLst>
       <p:ext uri="{BB962C8B-B14F-4D97-AF65-F5344CB8AC3E}">
-        <p14:creationId xmlns:p14="http://schemas.microsoft.com/office/powerpoint/2010/main" val="3232302086"/>
+        <p14:creationId xmlns:p14="http://schemas.microsoft.com/office/powerpoint/2010/main" xmlns="" val="3232302086"/>
       </p:ext>
     </p:extLst>
   </p:cSld>
@@ -5026,7 +5050,7 @@
   <p:timing>
     <p:tnLst>
       <p:par>
-        <p:cTn xmlns:p14="http://schemas.microsoft.com/office/powerpoint/2010/main" id="1" dur="indefinite" restart="never" nodeType="tmRoot"/>
+        <p:cTn id="1" dur="indefinite" restart="never" nodeType="tmRoot"/>
       </p:par>
     </p:tnLst>
   </p:timing>
@@ -5078,7 +5102,7 @@
     </p:spTree>
     <p:extLst>
       <p:ext uri="{BB962C8B-B14F-4D97-AF65-F5344CB8AC3E}">
-        <p14:creationId xmlns:p14="http://schemas.microsoft.com/office/powerpoint/2010/main" val="2384627434"/>
+        <p14:creationId xmlns:p14="http://schemas.microsoft.com/office/powerpoint/2010/main" xmlns="" val="2384627434"/>
       </p:ext>
     </p:extLst>
   </p:cSld>
@@ -5088,7 +5112,7 @@
   <p:timing>
     <p:tnLst>
       <p:par>
-        <p:cTn xmlns:p14="http://schemas.microsoft.com/office/powerpoint/2010/main" id="1" dur="indefinite" restart="never" nodeType="tmRoot"/>
+        <p:cTn id="1" dur="indefinite" restart="never" nodeType="tmRoot"/>
       </p:par>
     </p:tnLst>
   </p:timing>
@@ -5140,7 +5164,7 @@
     </p:spTree>
     <p:extLst>
       <p:ext uri="{BB962C8B-B14F-4D97-AF65-F5344CB8AC3E}">
-        <p14:creationId xmlns:p14="http://schemas.microsoft.com/office/powerpoint/2010/main" val="3146781203"/>
+        <p14:creationId xmlns:p14="http://schemas.microsoft.com/office/powerpoint/2010/main" xmlns="" val="3146781203"/>
       </p:ext>
     </p:extLst>
   </p:cSld>
@@ -5150,7 +5174,7 @@
   <p:timing>
     <p:tnLst>
       <p:par>
-        <p:cTn xmlns:p14="http://schemas.microsoft.com/office/powerpoint/2010/main" id="1" dur="indefinite" restart="never" nodeType="tmRoot"/>
+        <p:cTn id="1" dur="indefinite" restart="never" nodeType="tmRoot"/>
       </p:par>
     </p:tnLst>
   </p:timing>
@@ -5370,7 +5394,7 @@
     </p:spTree>
     <p:extLst>
       <p:ext uri="{BB962C8B-B14F-4D97-AF65-F5344CB8AC3E}">
-        <p14:creationId xmlns:p14="http://schemas.microsoft.com/office/powerpoint/2010/main" val="3521192348"/>
+        <p14:creationId xmlns:p14="http://schemas.microsoft.com/office/powerpoint/2010/main" xmlns="" val="3521192348"/>
       </p:ext>
     </p:extLst>
   </p:cSld>
@@ -5380,7 +5404,7 @@
   <p:timing>
     <p:tnLst>
       <p:par>
-        <p:cTn xmlns:p14="http://schemas.microsoft.com/office/powerpoint/2010/main" id="1" dur="indefinite" restart="never" nodeType="tmRoot"/>
+        <p:cTn id="1" dur="indefinite" restart="never" nodeType="tmRoot"/>
       </p:par>
     </p:tnLst>
   </p:timing>
@@ -5455,7 +5479,15 @@
             </a:pPr>
             <a:r>
               <a:rPr lang="en-US" sz="3200" dirty="0" smtClean="0"/>
-              <a:t>Tourism is A major asset to any country’s economic wealth.</a:t>
+              <a:t>Tourism is </a:t>
+            </a:r>
+            <a:r>
+              <a:rPr lang="en-US" sz="3200" dirty="0" smtClean="0"/>
+              <a:t>a </a:t>
+            </a:r>
+            <a:r>
+              <a:rPr lang="en-US" sz="3200" dirty="0" smtClean="0"/>
+              <a:t>major asset to any country’s economic wealth.</a:t>
             </a:r>
           </a:p>
           <a:p>
@@ -5498,7 +5530,7 @@
     </p:spTree>
     <p:extLst>
       <p:ext uri="{BB962C8B-B14F-4D97-AF65-F5344CB8AC3E}">
-        <p14:creationId xmlns:p14="http://schemas.microsoft.com/office/powerpoint/2010/main" val="920313806"/>
+        <p14:creationId xmlns:p14="http://schemas.microsoft.com/office/powerpoint/2010/main" xmlns="" val="920313806"/>
       </p:ext>
     </p:extLst>
   </p:cSld>
@@ -5508,7 +5540,7 @@
   <p:timing>
     <p:tnLst>
       <p:par>
-        <p:cTn xmlns:p14="http://schemas.microsoft.com/office/powerpoint/2010/main" id="1" dur="indefinite" restart="never" nodeType="tmRoot"/>
+        <p:cTn id="1" dur="indefinite" restart="never" nodeType="tmRoot"/>
       </p:par>
     </p:tnLst>
   </p:timing>
@@ -5565,7 +5597,7 @@
     </p:spTree>
     <p:extLst>
       <p:ext uri="{BB962C8B-B14F-4D97-AF65-F5344CB8AC3E}">
-        <p14:creationId xmlns:p14="http://schemas.microsoft.com/office/powerpoint/2010/main" val="1576779227"/>
+        <p14:creationId xmlns:p14="http://schemas.microsoft.com/office/powerpoint/2010/main" xmlns="" val="1576779227"/>
       </p:ext>
     </p:extLst>
   </p:cSld>
@@ -5575,7 +5607,7 @@
   <p:timing>
     <p:tnLst>
       <p:par>
-        <p:cTn xmlns:p14="http://schemas.microsoft.com/office/powerpoint/2010/main" id="1" dur="indefinite" restart="never" nodeType="tmRoot"/>
+        <p:cTn id="1" dur="indefinite" restart="never" nodeType="tmRoot"/>
       </p:par>
     </p:tnLst>
   </p:timing>
@@ -5711,7 +5743,7 @@
     </p:spTree>
     <p:extLst>
       <p:ext uri="{BB962C8B-B14F-4D97-AF65-F5344CB8AC3E}">
-        <p14:creationId xmlns:p14="http://schemas.microsoft.com/office/powerpoint/2010/main" val="1234136891"/>
+        <p14:creationId xmlns:p14="http://schemas.microsoft.com/office/powerpoint/2010/main" xmlns="" val="1234136891"/>
       </p:ext>
     </p:extLst>
   </p:cSld>
@@ -5721,7 +5753,7 @@
   <p:timing>
     <p:tnLst>
       <p:par>
-        <p:cTn xmlns:p14="http://schemas.microsoft.com/office/powerpoint/2010/main" id="1" dur="indefinite" restart="never" nodeType="tmRoot"/>
+        <p:cTn id="1" dur="indefinite" restart="never" nodeType="tmRoot"/>
       </p:par>
     </p:tnLst>
   </p:timing>
@@ -5871,7 +5903,7 @@
     </p:spTree>
     <p:extLst>
       <p:ext uri="{BB962C8B-B14F-4D97-AF65-F5344CB8AC3E}">
-        <p14:creationId xmlns:p14="http://schemas.microsoft.com/office/powerpoint/2010/main" val="3387159888"/>
+        <p14:creationId xmlns:p14="http://schemas.microsoft.com/office/powerpoint/2010/main" xmlns="" val="3387159888"/>
       </p:ext>
     </p:extLst>
   </p:cSld>
@@ -5881,7 +5913,7 @@
   <p:timing>
     <p:tnLst>
       <p:par>
-        <p:cTn xmlns:p14="http://schemas.microsoft.com/office/powerpoint/2010/main" id="1" dur="indefinite" restart="never" nodeType="tmRoot"/>
+        <p:cTn id="1" dur="indefinite" restart="never" nodeType="tmRoot"/>
       </p:par>
     </p:tnLst>
   </p:timing>
@@ -6141,7 +6173,7 @@
     </p:spTree>
     <p:extLst>
       <p:ext uri="{BB962C8B-B14F-4D97-AF65-F5344CB8AC3E}">
-        <p14:creationId xmlns:p14="http://schemas.microsoft.com/office/powerpoint/2010/main" val="1079774974"/>
+        <p14:creationId xmlns:p14="http://schemas.microsoft.com/office/powerpoint/2010/main" xmlns="" val="1079774974"/>
       </p:ext>
     </p:extLst>
   </p:cSld>
@@ -6151,7 +6183,7 @@
   <p:timing>
     <p:tnLst>
       <p:par>
-        <p:cTn xmlns:p14="http://schemas.microsoft.com/office/powerpoint/2010/main" id="1" dur="indefinite" restart="never" nodeType="tmRoot"/>
+        <p:cTn id="1" dur="indefinite" restart="never" nodeType="tmRoot"/>
       </p:par>
     </p:tnLst>
   </p:timing>
@@ -6465,7 +6497,7 @@
     </p:spTree>
     <p:extLst>
       <p:ext uri="{BB962C8B-B14F-4D97-AF65-F5344CB8AC3E}">
-        <p14:creationId xmlns:p14="http://schemas.microsoft.com/office/powerpoint/2010/main" val="3539133297"/>
+        <p14:creationId xmlns:p14="http://schemas.microsoft.com/office/powerpoint/2010/main" xmlns="" val="3539133297"/>
       </p:ext>
     </p:extLst>
   </p:cSld>
@@ -6475,7 +6507,7 @@
   <p:timing>
     <p:tnLst>
       <p:par>
-        <p:cTn xmlns:p14="http://schemas.microsoft.com/office/powerpoint/2010/main" id="1" dur="indefinite" restart="never" nodeType="tmRoot"/>
+        <p:cTn id="1" dur="indefinite" restart="never" nodeType="tmRoot"/>
       </p:par>
     </p:tnLst>
   </p:timing>
@@ -6777,7 +6809,7 @@
     </p:spTree>
     <p:extLst>
       <p:ext uri="{BB962C8B-B14F-4D97-AF65-F5344CB8AC3E}">
-        <p14:creationId xmlns:p14="http://schemas.microsoft.com/office/powerpoint/2010/main" val="313000359"/>
+        <p14:creationId xmlns:p14="http://schemas.microsoft.com/office/powerpoint/2010/main" xmlns="" val="313000359"/>
       </p:ext>
     </p:extLst>
   </p:cSld>
@@ -6787,7 +6819,7 @@
   <p:timing>
     <p:tnLst>
       <p:par>
-        <p:cTn xmlns:p14="http://schemas.microsoft.com/office/powerpoint/2010/main" id="1" dur="indefinite" restart="never" nodeType="tmRoot"/>
+        <p:cTn id="1" dur="indefinite" restart="never" nodeType="tmRoot"/>
       </p:par>
     </p:tnLst>
   </p:timing>
@@ -7596,7 +7628,7 @@
     </p:spTree>
     <p:extLst>
       <p:ext uri="{BB962C8B-B14F-4D97-AF65-F5344CB8AC3E}">
-        <p14:creationId xmlns:p14="http://schemas.microsoft.com/office/powerpoint/2010/main" val="1484827292"/>
+        <p14:creationId xmlns:p14="http://schemas.microsoft.com/office/powerpoint/2010/main" xmlns="" val="1484827292"/>
       </p:ext>
     </p:extLst>
   </p:cSld>
@@ -7606,7 +7638,7 @@
   <p:timing>
     <p:tnLst>
       <p:par>
-        <p:cTn xmlns:p14="http://schemas.microsoft.com/office/powerpoint/2010/main" id="1" dur="indefinite" restart="never" nodeType="tmRoot"/>
+        <p:cTn id="1" dur="indefinite" restart="never" nodeType="tmRoot"/>
       </p:par>
     </p:tnLst>
   </p:timing>
@@ -7658,7 +7690,7 @@
     </p:spTree>
     <p:extLst>
       <p:ext uri="{BB962C8B-B14F-4D97-AF65-F5344CB8AC3E}">
-        <p14:creationId xmlns:p14="http://schemas.microsoft.com/office/powerpoint/2010/main" val="3129850155"/>
+        <p14:creationId xmlns:p14="http://schemas.microsoft.com/office/powerpoint/2010/main" xmlns="" val="3129850155"/>
       </p:ext>
     </p:extLst>
   </p:cSld>
@@ -7668,7 +7700,7 @@
   <p:timing>
     <p:tnLst>
       <p:par>
-        <p:cTn xmlns:p14="http://schemas.microsoft.com/office/powerpoint/2010/main" id="1" dur="indefinite" restart="never" nodeType="tmRoot"/>
+        <p:cTn id="1" dur="indefinite" restart="never" nodeType="tmRoot"/>
       </p:par>
     </p:tnLst>
   </p:timing>

</xml_diff>